<commit_message>
Logo and layout updates
</commit_message>
<xml_diff>
--- a/images/logo.pptx
+++ b/images/logo.pptx
@@ -104,6 +104,22 @@
       </a:defRPr>
     </a:lvl9pPr>
   </p:defaultTextStyle>
+  <p:extLst>
+    <p:ext uri="{EFAFB233-063F-42B5-8137-9DF3F51BA10A}">
+      <p15:sldGuideLst xmlns:p15="http://schemas.microsoft.com/office/powerpoint/2012/main">
+        <p15:guide id="1" orient="horz" pos="2160">
+          <p15:clr>
+            <a:srgbClr val="A4A3A4"/>
+          </p15:clr>
+        </p15:guide>
+        <p15:guide id="2" pos="2880">
+          <p15:clr>
+            <a:srgbClr val="A4A3A4"/>
+          </p15:clr>
+        </p15:guide>
+      </p15:sldGuideLst>
+    </p:ext>
+  </p:extLst>
 </p:presentation>
 </file>
 
@@ -288,7 +304,7 @@
           <a:p>
             <a:fld id="{DED9F407-87FE-4650-A500-EE7D3AFB3CCE}" type="datetimeFigureOut">
               <a:rPr lang="en-US" smtClean="0"/>
-              <a:t>7/21/2011</a:t>
+              <a:t>3/4/2016</a:t>
             </a:fld>
             <a:endParaRPr lang="en-US"/>
           </a:p>
@@ -453,7 +469,7 @@
           <a:p>
             <a:fld id="{DED9F407-87FE-4650-A500-EE7D3AFB3CCE}" type="datetimeFigureOut">
               <a:rPr lang="en-US" smtClean="0"/>
-              <a:t>7/21/2011</a:t>
+              <a:t>3/4/2016</a:t>
             </a:fld>
             <a:endParaRPr lang="en-US"/>
           </a:p>
@@ -628,7 +644,7 @@
           <a:p>
             <a:fld id="{DED9F407-87FE-4650-A500-EE7D3AFB3CCE}" type="datetimeFigureOut">
               <a:rPr lang="en-US" smtClean="0"/>
-              <a:t>7/21/2011</a:t>
+              <a:t>3/4/2016</a:t>
             </a:fld>
             <a:endParaRPr lang="en-US"/>
           </a:p>
@@ -793,7 +809,7 @@
           <a:p>
             <a:fld id="{DED9F407-87FE-4650-A500-EE7D3AFB3CCE}" type="datetimeFigureOut">
               <a:rPr lang="en-US" smtClean="0"/>
-              <a:t>7/21/2011</a:t>
+              <a:t>3/4/2016</a:t>
             </a:fld>
             <a:endParaRPr lang="en-US"/>
           </a:p>
@@ -1034,7 +1050,7 @@
           <a:p>
             <a:fld id="{DED9F407-87FE-4650-A500-EE7D3AFB3CCE}" type="datetimeFigureOut">
               <a:rPr lang="en-US" smtClean="0"/>
-              <a:t>7/21/2011</a:t>
+              <a:t>3/4/2016</a:t>
             </a:fld>
             <a:endParaRPr lang="en-US"/>
           </a:p>
@@ -1317,7 +1333,7 @@
           <a:p>
             <a:fld id="{DED9F407-87FE-4650-A500-EE7D3AFB3CCE}" type="datetimeFigureOut">
               <a:rPr lang="en-US" smtClean="0"/>
-              <a:t>7/21/2011</a:t>
+              <a:t>3/4/2016</a:t>
             </a:fld>
             <a:endParaRPr lang="en-US"/>
           </a:p>
@@ -1734,7 +1750,7 @@
           <a:p>
             <a:fld id="{DED9F407-87FE-4650-A500-EE7D3AFB3CCE}" type="datetimeFigureOut">
               <a:rPr lang="en-US" smtClean="0"/>
-              <a:t>7/21/2011</a:t>
+              <a:t>3/4/2016</a:t>
             </a:fld>
             <a:endParaRPr lang="en-US"/>
           </a:p>
@@ -1847,7 +1863,7 @@
           <a:p>
             <a:fld id="{DED9F407-87FE-4650-A500-EE7D3AFB3CCE}" type="datetimeFigureOut">
               <a:rPr lang="en-US" smtClean="0"/>
-              <a:t>7/21/2011</a:t>
+              <a:t>3/4/2016</a:t>
             </a:fld>
             <a:endParaRPr lang="en-US"/>
           </a:p>
@@ -1937,7 +1953,7 @@
           <a:p>
             <a:fld id="{DED9F407-87FE-4650-A500-EE7D3AFB3CCE}" type="datetimeFigureOut">
               <a:rPr lang="en-US" smtClean="0"/>
-              <a:t>7/21/2011</a:t>
+              <a:t>3/4/2016</a:t>
             </a:fld>
             <a:endParaRPr lang="en-US"/>
           </a:p>
@@ -2209,7 +2225,7 @@
           <a:p>
             <a:fld id="{DED9F407-87FE-4650-A500-EE7D3AFB3CCE}" type="datetimeFigureOut">
               <a:rPr lang="en-US" smtClean="0"/>
-              <a:t>7/21/2011</a:t>
+              <a:t>3/4/2016</a:t>
             </a:fld>
             <a:endParaRPr lang="en-US"/>
           </a:p>
@@ -2457,7 +2473,7 @@
           <a:p>
             <a:fld id="{DED9F407-87FE-4650-A500-EE7D3AFB3CCE}" type="datetimeFigureOut">
               <a:rPr lang="en-US" smtClean="0"/>
-              <a:t>7/21/2011</a:t>
+              <a:t>3/4/2016</a:t>
             </a:fld>
             <a:endParaRPr lang="en-US"/>
           </a:p>
@@ -2665,7 +2681,7 @@
           <a:p>
             <a:fld id="{DED9F407-87FE-4650-A500-EE7D3AFB3CCE}" type="datetimeFigureOut">
               <a:rPr lang="en-US" smtClean="0"/>
-              <a:t>7/21/2011</a:t>
+              <a:t>3/4/2016</a:t>
             </a:fld>
             <a:endParaRPr lang="en-US"/>
           </a:p>
@@ -3035,6 +3051,36 @@
           <a:chExt cx="0" cy="0"/>
         </a:xfrm>
       </p:grpSpPr>
+      <p:pic>
+        <p:nvPicPr>
+          <p:cNvPr id="2" name="Picture 1"/>
+          <p:cNvPicPr>
+            <a:picLocks noChangeAspect="1"/>
+          </p:cNvPicPr>
+          <p:nvPr/>
+        </p:nvPicPr>
+        <p:blipFill>
+          <a:blip r:embed="rId2" cstate="print">
+            <a:extLst>
+              <a:ext uri="{28A0092B-C50C-407E-A947-70E740481C1C}">
+                <a14:useLocalDpi xmlns:a14="http://schemas.microsoft.com/office/drawing/2010/main" val="0"/>
+              </a:ext>
+            </a:extLst>
+          </a:blip>
+          <a:stretch>
+            <a:fillRect/>
+          </a:stretch>
+        </p:blipFill>
+        <p:spPr>
+          <a:xfrm>
+            <a:off x="-152400" y="-1009719"/>
+            <a:ext cx="9372600" cy="7861541"/>
+          </a:xfrm>
+          <a:prstGeom prst="rect">
+            <a:avLst/>
+          </a:prstGeom>
+        </p:spPr>
+      </p:pic>
       <p:sp>
         <p:nvSpPr>
           <p:cNvPr id="5" name="Rectangle 4"/>
@@ -3043,8 +3089,8 @@
         </p:nvSpPr>
         <p:spPr>
           <a:xfrm>
-            <a:off x="2022741" y="1371601"/>
-            <a:ext cx="5063859" cy="4401205"/>
+            <a:off x="304800" y="609600"/>
+            <a:ext cx="8763000" cy="5324535"/>
           </a:xfrm>
           <a:prstGeom prst="rect">
             <a:avLst/>
@@ -3054,265 +3100,115 @@
         <p:txBody>
           <a:bodyPr wrap="square" lIns="91440" tIns="45720" rIns="91440" bIns="45720">
             <a:spAutoFit/>
-            <a:scene3d>
-              <a:camera prst="orthographicFront"/>
-              <a:lightRig rig="glow" dir="tl">
-                <a:rot lat="0" lon="0" rev="5400000"/>
-              </a:lightRig>
-            </a:scene3d>
-            <a:sp3d contourW="12700">
-              <a:bevelT w="25400" h="25400"/>
-              <a:contourClr>
-                <a:schemeClr val="accent6">
-                  <a:shade val="73000"/>
-                </a:schemeClr>
-              </a:contourClr>
-            </a:sp3d>
           </a:bodyPr>
           <a:lstStyle/>
           <a:p>
             <a:pPr algn="ctr"/>
-            <a:r>
-              <a:rPr lang="en-US" sz="7000" b="1" cap="none" spc="0" dirty="0" smtClean="0">
-                <a:ln w="11430">
+            <a:endParaRPr lang="en-US" sz="5000" b="1" dirty="0" smtClean="0">
+              <a:ln w="57150">
+                <a:solidFill>
+                  <a:schemeClr val="accent2">
+                    <a:lumMod val="75000"/>
+                  </a:schemeClr>
+                </a:solidFill>
+                <a:prstDash val="solid"/>
+              </a:ln>
+              <a:solidFill>
+                <a:srgbClr val="F57979"/>
+              </a:solidFill>
+              <a:latin typeface="Trebuchet MS" pitchFamily="34" charset="0"/>
+            </a:endParaRPr>
+          </a:p>
+          <a:p>
+            <a:pPr algn="ctr"/>
+            <a:r>
+              <a:rPr lang="en-US" sz="12000" b="1" dirty="0" smtClean="0">
+                <a:ln w="57150">
                   <a:solidFill>
-                    <a:schemeClr val="tx1"/>
+                    <a:schemeClr val="accent2">
+                      <a:lumMod val="75000"/>
+                    </a:schemeClr>
                   </a:solidFill>
+                  <a:prstDash val="solid"/>
                 </a:ln>
-                <a:gradFill>
-                  <a:gsLst>
-                    <a:gs pos="0">
-                      <a:schemeClr val="accent6">
-                        <a:tint val="90000"/>
-                        <a:satMod val="120000"/>
-                      </a:schemeClr>
-                    </a:gs>
-                    <a:gs pos="25000">
-                      <a:schemeClr val="accent6">
-                        <a:tint val="93000"/>
-                        <a:satMod val="120000"/>
-                      </a:schemeClr>
-                    </a:gs>
-                    <a:gs pos="50000">
-                      <a:schemeClr val="accent6">
-                        <a:shade val="89000"/>
-                        <a:satMod val="110000"/>
-                      </a:schemeClr>
-                    </a:gs>
-                    <a:gs pos="75000">
-                      <a:schemeClr val="accent6">
-                        <a:tint val="93000"/>
-                        <a:satMod val="120000"/>
-                      </a:schemeClr>
-                    </a:gs>
-                    <a:gs pos="100000">
-                      <a:schemeClr val="accent6">
-                        <a:tint val="90000"/>
-                        <a:satMod val="120000"/>
-                      </a:schemeClr>
-                    </a:gs>
-                  </a:gsLst>
-                  <a:lin ang="5400000"/>
-                </a:gradFill>
-                <a:effectLst>
-                  <a:outerShdw blurRad="80000" dist="40000" dir="5040000" algn="tl">
-                    <a:srgbClr val="000000">
-                      <a:alpha val="30000"/>
-                    </a:srgbClr>
-                  </a:outerShdw>
-                </a:effectLst>
+                <a:solidFill>
+                  <a:srgbClr val="F57979"/>
+                </a:solidFill>
                 <a:latin typeface="Trebuchet MS" pitchFamily="34" charset="0"/>
               </a:rPr>
-              <a:t>MAKE YOUR</a:t>
+              <a:t>MAKE </a:t>
+            </a:r>
+            <a:r>
+              <a:rPr lang="en-US" sz="12000" b="1" dirty="0" smtClean="0">
+                <a:ln w="57150">
+                  <a:solidFill>
+                    <a:schemeClr val="accent2">
+                      <a:lumMod val="75000"/>
+                    </a:schemeClr>
+                  </a:solidFill>
+                  <a:prstDash val="solid"/>
+                </a:ln>
+                <a:solidFill>
+                  <a:srgbClr val="F57979"/>
+                </a:solidFill>
+                <a:latin typeface="Trebuchet MS" pitchFamily="34" charset="0"/>
+              </a:rPr>
+              <a:t>YOUR</a:t>
             </a:r>
           </a:p>
           <a:p>
             <a:pPr algn="ctr"/>
-            <a:endParaRPr lang="en-US" sz="14000" b="1" dirty="0">
-              <a:ln w="11430">
+            <a:endParaRPr lang="en-US" sz="5000" b="1" dirty="0" smtClean="0">
+              <a:ln w="57150">
                 <a:solidFill>
-                  <a:schemeClr val="tx1"/>
+                  <a:schemeClr val="accent2">
+                    <a:lumMod val="75000"/>
+                  </a:schemeClr>
                 </a:solidFill>
+                <a:prstDash val="solid"/>
               </a:ln>
-              <a:gradFill>
-                <a:gsLst>
-                  <a:gs pos="0">
-                    <a:schemeClr val="accent6">
-                      <a:tint val="90000"/>
-                      <a:satMod val="120000"/>
-                    </a:schemeClr>
-                  </a:gs>
-                  <a:gs pos="25000">
-                    <a:schemeClr val="accent6">
-                      <a:tint val="93000"/>
-                      <a:satMod val="120000"/>
-                    </a:schemeClr>
-                  </a:gs>
-                  <a:gs pos="50000">
-                    <a:schemeClr val="accent6">
-                      <a:shade val="89000"/>
-                      <a:satMod val="110000"/>
-                    </a:schemeClr>
-                  </a:gs>
-                  <a:gs pos="75000">
-                    <a:schemeClr val="accent6">
-                      <a:tint val="93000"/>
-                      <a:satMod val="120000"/>
-                    </a:schemeClr>
-                  </a:gs>
-                  <a:gs pos="100000">
-                    <a:schemeClr val="accent6">
-                      <a:tint val="90000"/>
-                      <a:satMod val="120000"/>
-                    </a:schemeClr>
-                  </a:gs>
-                </a:gsLst>
-                <a:lin ang="5400000"/>
-              </a:gradFill>
-              <a:effectLst>
-                <a:outerShdw blurRad="80000" dist="40000" dir="5040000" algn="tl">
-                  <a:srgbClr val="000000">
-                    <a:alpha val="30000"/>
-                  </a:srgbClr>
-                </a:outerShdw>
-              </a:effectLst>
+              <a:solidFill>
+                <a:srgbClr val="F57979"/>
+              </a:solidFill>
               <a:latin typeface="Trebuchet MS" pitchFamily="34" charset="0"/>
             </a:endParaRPr>
           </a:p>
           <a:p>
             <a:pPr algn="ctr"/>
             <a:r>
-              <a:rPr lang="en-US" sz="7000" b="1" cap="none" spc="0" dirty="0" smtClean="0">
-                <a:ln w="11430">
+              <a:rPr lang="en-US" sz="12000" b="1" dirty="0" smtClean="0">
+                <a:ln w="57150">
                   <a:solidFill>
-                    <a:schemeClr val="tx1"/>
+                    <a:schemeClr val="accent2">
+                      <a:lumMod val="75000"/>
+                    </a:schemeClr>
                   </a:solidFill>
+                  <a:prstDash val="solid"/>
                 </a:ln>
-                <a:gradFill>
-                  <a:gsLst>
-                    <a:gs pos="0">
-                      <a:schemeClr val="accent6">
-                        <a:tint val="90000"/>
-                        <a:satMod val="120000"/>
-                      </a:schemeClr>
-                    </a:gs>
-                    <a:gs pos="25000">
-                      <a:schemeClr val="accent6">
-                        <a:tint val="93000"/>
-                        <a:satMod val="120000"/>
-                      </a:schemeClr>
-                    </a:gs>
-                    <a:gs pos="50000">
-                      <a:schemeClr val="accent6">
-                        <a:shade val="89000"/>
-                        <a:satMod val="110000"/>
-                      </a:schemeClr>
-                    </a:gs>
-                    <a:gs pos="75000">
-                      <a:schemeClr val="accent6">
-                        <a:tint val="93000"/>
-                        <a:satMod val="120000"/>
-                      </a:schemeClr>
-                    </a:gs>
-                    <a:gs pos="100000">
-                      <a:schemeClr val="accent6">
-                        <a:tint val="90000"/>
-                        <a:satMod val="120000"/>
-                      </a:schemeClr>
-                    </a:gs>
-                  </a:gsLst>
-                  <a:lin ang="5400000"/>
-                </a:gradFill>
-                <a:effectLst>
-                  <a:outerShdw blurRad="80000" dist="40000" dir="5040000" algn="tl">
-                    <a:srgbClr val="000000">
-                      <a:alpha val="30000"/>
-                    </a:srgbClr>
-                  </a:outerShdw>
-                </a:effectLst>
+                <a:solidFill>
+                  <a:srgbClr val="F57979"/>
+                </a:solidFill>
                 <a:latin typeface="Trebuchet MS" pitchFamily="34" charset="0"/>
               </a:rPr>
               <a:t>MARK</a:t>
             </a:r>
-            <a:endParaRPr lang="en-US" sz="7000" b="1" cap="none" spc="0" dirty="0">
-              <a:ln w="11430">
+            <a:endParaRPr lang="en-US" sz="12000" b="1" dirty="0">
+              <a:ln w="57150">
                 <a:solidFill>
-                  <a:schemeClr val="tx1"/>
+                  <a:schemeClr val="accent2">
+                    <a:lumMod val="75000"/>
+                  </a:schemeClr>
                 </a:solidFill>
+                <a:prstDash val="solid"/>
               </a:ln>
-              <a:gradFill>
-                <a:gsLst>
-                  <a:gs pos="0">
-                    <a:schemeClr val="accent6">
-                      <a:tint val="90000"/>
-                      <a:satMod val="120000"/>
-                    </a:schemeClr>
-                  </a:gs>
-                  <a:gs pos="25000">
-                    <a:schemeClr val="accent6">
-                      <a:tint val="93000"/>
-                      <a:satMod val="120000"/>
-                    </a:schemeClr>
-                  </a:gs>
-                  <a:gs pos="50000">
-                    <a:schemeClr val="accent6">
-                      <a:shade val="89000"/>
-                      <a:satMod val="110000"/>
-                    </a:schemeClr>
-                  </a:gs>
-                  <a:gs pos="75000">
-                    <a:schemeClr val="accent6">
-                      <a:tint val="93000"/>
-                      <a:satMod val="120000"/>
-                    </a:schemeClr>
-                  </a:gs>
-                  <a:gs pos="100000">
-                    <a:schemeClr val="accent6">
-                      <a:tint val="90000"/>
-                      <a:satMod val="120000"/>
-                    </a:schemeClr>
-                  </a:gs>
-                </a:gsLst>
-                <a:lin ang="5400000"/>
-              </a:gradFill>
-              <a:effectLst>
-                <a:outerShdw blurRad="80000" dist="40000" dir="5040000" algn="tl">
-                  <a:srgbClr val="000000">
-                    <a:alpha val="30000"/>
-                  </a:srgbClr>
-                </a:outerShdw>
-              </a:effectLst>
+              <a:solidFill>
+                <a:srgbClr val="F57979"/>
+              </a:solidFill>
               <a:latin typeface="Trebuchet MS" pitchFamily="34" charset="0"/>
             </a:endParaRPr>
           </a:p>
         </p:txBody>
       </p:sp>
-      <p:pic>
-        <p:nvPicPr>
-          <p:cNvPr id="1026" name="Picture 2" descr="C:\Users\Hers\AppData\Local\Microsoft\Windows\Temporary Internet Files\Content.IE5\98LYN8CQ\MC900439819[1].png"/>
-          <p:cNvPicPr>
-            <a:picLocks noChangeAspect="1" noChangeArrowheads="1"/>
-          </p:cNvPicPr>
-          <p:nvPr/>
-        </p:nvPicPr>
-        <p:blipFill>
-          <a:blip r:embed="rId2" cstate="print"/>
-          <a:srcRect/>
-          <a:stretch>
-            <a:fillRect/>
-          </a:stretch>
-        </p:blipFill>
-        <p:spPr bwMode="auto">
-          <a:xfrm>
-            <a:off x="3200400" y="2198783"/>
-            <a:ext cx="2743200" cy="2743200"/>
-          </a:xfrm>
-          <a:prstGeom prst="rect">
-            <a:avLst/>
-          </a:prstGeom>
-          <a:noFill/>
-        </p:spPr>
-      </p:pic>
     </p:spTree>
   </p:cSld>
   <p:clrMapOvr>

</xml_diff>